<commit_message>
Modificación de los documentos
</commit_message>
<xml_diff>
--- a/Documentos_generados/Integracion_Alcance/Alcance/WBS.pptx
+++ b/Documentos_generados/Integracion_Alcance/Alcance/WBS.pptx
@@ -1454,7 +1454,7 @@
         </a:p>
       </dgm:t>
     </dgm:pt>
-    <dgm:pt modelId="{C6E69E37-3961-44EE-94E9-D23872BEE4C9}">
+    <dgm:pt modelId="{142E7667-7801-477A-80B1-678DFCEE8B9B}">
       <dgm:prSet/>
       <dgm:spPr/>
       <dgm:t>
@@ -1463,13 +1463,13 @@
         <a:p>
           <a:r>
             <a:rPr lang="es-ES_tradnl" dirty="0"/>
-            <a:t>4.2. Control de procesos</a:t>
+            <a:t>5.1. Modelo de formación</a:t>
           </a:r>
           <a:endParaRPr lang="es-ES" dirty="0"/>
         </a:p>
       </dgm:t>
     </dgm:pt>
-    <dgm:pt modelId="{39E7187F-BF44-4434-ABA8-1C914D1E277A}" type="parTrans" cxnId="{6C09A7CF-ED9E-4F5C-A208-29FC73FCD37A}">
+    <dgm:pt modelId="{ACDCB4B0-FE3A-4189-B855-4AF36F6C0D74}" type="parTrans" cxnId="{4236410F-A92F-4C87-BF14-3DA943DADA64}">
       <dgm:prSet/>
       <dgm:spPr/>
       <dgm:t>
@@ -1480,7 +1480,7 @@
         </a:p>
       </dgm:t>
     </dgm:pt>
-    <dgm:pt modelId="{DEA9B8DE-9278-41C4-8958-F47B791467F4}" type="sibTrans" cxnId="{6C09A7CF-ED9E-4F5C-A208-29FC73FCD37A}">
+    <dgm:pt modelId="{5C06A405-8210-48F4-A408-225051F39FBE}" type="sibTrans" cxnId="{4236410F-A92F-4C87-BF14-3DA943DADA64}">
       <dgm:prSet/>
       <dgm:spPr/>
       <dgm:t>
@@ -1491,7 +1491,7 @@
         </a:p>
       </dgm:t>
     </dgm:pt>
-    <dgm:pt modelId="{DEA8DC5E-722E-4FFF-BA91-EA999F6AAE91}">
+    <dgm:pt modelId="{6343E979-4FE4-4A70-B59E-3E22D3659816}">
       <dgm:prSet/>
       <dgm:spPr/>
       <dgm:t>
@@ -1500,13 +1500,13 @@
         <a:p>
           <a:r>
             <a:rPr lang="es-ES_tradnl" dirty="0"/>
-            <a:t>4.2. Gestión de compras</a:t>
+            <a:t>5.2. Formación de Personal</a:t>
           </a:r>
           <a:endParaRPr lang="es-ES" dirty="0"/>
         </a:p>
       </dgm:t>
     </dgm:pt>
-    <dgm:pt modelId="{CA5091F9-074B-4255-B185-C09D0BE2BF7B}" type="parTrans" cxnId="{8AF7D83C-2A35-4B4E-9A89-87807C35D1FB}">
+    <dgm:pt modelId="{7A8423F9-E18F-49C7-AF47-88948CD8E18D}" type="parTrans" cxnId="{E66A6DFA-838B-4265-BAE3-732A6B928409}">
       <dgm:prSet/>
       <dgm:spPr/>
       <dgm:t>
@@ -1517,7 +1517,7 @@
         </a:p>
       </dgm:t>
     </dgm:pt>
-    <dgm:pt modelId="{64D4773E-534A-4E7B-A0A1-8D87DE867EA7}" type="sibTrans" cxnId="{8AF7D83C-2A35-4B4E-9A89-87807C35D1FB}">
+    <dgm:pt modelId="{A2AAA9C3-C9BC-414E-AD60-200EF2F1EFA3}" type="sibTrans" cxnId="{E66A6DFA-838B-4265-BAE3-732A6B928409}">
       <dgm:prSet/>
       <dgm:spPr/>
       <dgm:t>
@@ -1528,7 +1528,7 @@
         </a:p>
       </dgm:t>
     </dgm:pt>
-    <dgm:pt modelId="{142E7667-7801-477A-80B1-678DFCEE8B9B}">
+    <dgm:pt modelId="{90E52BB7-1EB0-47DC-82EE-28BBD13D64E9}">
       <dgm:prSet/>
       <dgm:spPr/>
       <dgm:t>
@@ -1537,81 +1537,7 @@
         <a:p>
           <a:r>
             <a:rPr lang="es-ES_tradnl" dirty="0"/>
-            <a:t>5.1. Cursos</a:t>
-          </a:r>
-          <a:endParaRPr lang="es-ES" dirty="0"/>
-        </a:p>
-      </dgm:t>
-    </dgm:pt>
-    <dgm:pt modelId="{ACDCB4B0-FE3A-4189-B855-4AF36F6C0D74}" type="parTrans" cxnId="{4236410F-A92F-4C87-BF14-3DA943DADA64}">
-      <dgm:prSet/>
-      <dgm:spPr/>
-      <dgm:t>
-        <a:bodyPr/>
-        <a:lstStyle/>
-        <a:p>
-          <a:endParaRPr lang="es-ES"/>
-        </a:p>
-      </dgm:t>
-    </dgm:pt>
-    <dgm:pt modelId="{5C06A405-8210-48F4-A408-225051F39FBE}" type="sibTrans" cxnId="{4236410F-A92F-4C87-BF14-3DA943DADA64}">
-      <dgm:prSet/>
-      <dgm:spPr/>
-      <dgm:t>
-        <a:bodyPr/>
-        <a:lstStyle/>
-        <a:p>
-          <a:endParaRPr lang="es-ES"/>
-        </a:p>
-      </dgm:t>
-    </dgm:pt>
-    <dgm:pt modelId="{6343E979-4FE4-4A70-B59E-3E22D3659816}">
-      <dgm:prSet/>
-      <dgm:spPr/>
-      <dgm:t>
-        <a:bodyPr/>
-        <a:lstStyle/>
-        <a:p>
-          <a:r>
-            <a:rPr lang="es-ES_tradnl" dirty="0"/>
-            <a:t>5.2. Personal</a:t>
-          </a:r>
-          <a:endParaRPr lang="es-ES" dirty="0"/>
-        </a:p>
-      </dgm:t>
-    </dgm:pt>
-    <dgm:pt modelId="{7A8423F9-E18F-49C7-AF47-88948CD8E18D}" type="parTrans" cxnId="{E66A6DFA-838B-4265-BAE3-732A6B928409}">
-      <dgm:prSet/>
-      <dgm:spPr/>
-      <dgm:t>
-        <a:bodyPr/>
-        <a:lstStyle/>
-        <a:p>
-          <a:endParaRPr lang="es-ES"/>
-        </a:p>
-      </dgm:t>
-    </dgm:pt>
-    <dgm:pt modelId="{A2AAA9C3-C9BC-414E-AD60-200EF2F1EFA3}" type="sibTrans" cxnId="{E66A6DFA-838B-4265-BAE3-732A6B928409}">
-      <dgm:prSet/>
-      <dgm:spPr/>
-      <dgm:t>
-        <a:bodyPr/>
-        <a:lstStyle/>
-        <a:p>
-          <a:endParaRPr lang="es-ES"/>
-        </a:p>
-      </dgm:t>
-    </dgm:pt>
-    <dgm:pt modelId="{90E52BB7-1EB0-47DC-82EE-28BBD13D64E9}">
-      <dgm:prSet/>
-      <dgm:spPr/>
-      <dgm:t>
-        <a:bodyPr/>
-        <a:lstStyle/>
-        <a:p>
-          <a:r>
-            <a:rPr lang="es-ES_tradnl" dirty="0"/>
-            <a:t>5.3 Documentación</a:t>
+            <a:t>5.3 Manuales</a:t>
           </a:r>
           <a:endParaRPr lang="es-ES" dirty="0"/>
         </a:p>
@@ -2091,6 +2017,43 @@
         </a:p>
       </dgm:t>
     </dgm:pt>
+    <dgm:pt modelId="{C6E69E37-3961-44EE-94E9-D23872BEE4C9}">
+      <dgm:prSet/>
+      <dgm:spPr/>
+      <dgm:t>
+        <a:bodyPr/>
+        <a:lstStyle/>
+        <a:p>
+          <a:r>
+            <a:rPr lang="es-ES_tradnl" dirty="0"/>
+            <a:t>4.2. Control de procesos</a:t>
+          </a:r>
+          <a:endParaRPr lang="es-ES" dirty="0"/>
+        </a:p>
+      </dgm:t>
+    </dgm:pt>
+    <dgm:pt modelId="{DEA9B8DE-9278-41C4-8958-F47B791467F4}" type="sibTrans" cxnId="{6C09A7CF-ED9E-4F5C-A208-29FC73FCD37A}">
+      <dgm:prSet/>
+      <dgm:spPr/>
+      <dgm:t>
+        <a:bodyPr/>
+        <a:lstStyle/>
+        <a:p>
+          <a:endParaRPr lang="es-ES"/>
+        </a:p>
+      </dgm:t>
+    </dgm:pt>
+    <dgm:pt modelId="{39E7187F-BF44-4434-ABA8-1C914D1E277A}" type="parTrans" cxnId="{6C09A7CF-ED9E-4F5C-A208-29FC73FCD37A}">
+      <dgm:prSet/>
+      <dgm:spPr/>
+      <dgm:t>
+        <a:bodyPr/>
+        <a:lstStyle/>
+        <a:p>
+          <a:endParaRPr lang="es-ES"/>
+        </a:p>
+      </dgm:t>
+    </dgm:pt>
     <dgm:pt modelId="{327FBF58-624F-4F1F-9921-6E06642364B9}" type="pres">
       <dgm:prSet presAssocID="{664B246F-00B5-4610-86EB-ACE0B8B7FA38}" presName="mainComposite" presStyleCnt="0">
         <dgm:presLayoutVars>
@@ -2182,7 +2145,7 @@
       <dgm:spPr/>
     </dgm:pt>
     <dgm:pt modelId="{38D40A92-1EB9-4FB5-ADC1-9A0DF87BEE8D}" type="pres">
-      <dgm:prSet presAssocID="{78A11304-B47B-426C-80D9-23F105284D80}" presName="Name19" presStyleLbl="parChTrans1D4" presStyleIdx="0" presStyleCnt="15"/>
+      <dgm:prSet presAssocID="{78A11304-B47B-426C-80D9-23F105284D80}" presName="Name19" presStyleLbl="parChTrans1D4" presStyleIdx="0" presStyleCnt="14"/>
       <dgm:spPr/>
     </dgm:pt>
     <dgm:pt modelId="{59416600-D01D-44D5-A7DC-38ADD146E729}" type="pres">
@@ -2190,7 +2153,7 @@
       <dgm:spPr/>
     </dgm:pt>
     <dgm:pt modelId="{D5810A6F-9BEC-4CA9-A2D9-D690ED127B30}" type="pres">
-      <dgm:prSet presAssocID="{95F92B39-5BD1-41DA-921B-40270E333897}" presName="level2Shape" presStyleLbl="node4" presStyleIdx="0" presStyleCnt="15"/>
+      <dgm:prSet presAssocID="{95F92B39-5BD1-41DA-921B-40270E333897}" presName="level2Shape" presStyleLbl="node4" presStyleIdx="0" presStyleCnt="14"/>
       <dgm:spPr/>
     </dgm:pt>
     <dgm:pt modelId="{D087C909-8EBC-4A41-82A3-F989599A6FCF}" type="pres">
@@ -2198,7 +2161,7 @@
       <dgm:spPr/>
     </dgm:pt>
     <dgm:pt modelId="{03FC8A99-0567-4C91-89DE-DB16B2C0A767}" type="pres">
-      <dgm:prSet presAssocID="{51635E7D-94AB-42DB-A23F-6B9E2711ADB8}" presName="Name19" presStyleLbl="parChTrans1D4" presStyleIdx="1" presStyleCnt="15"/>
+      <dgm:prSet presAssocID="{51635E7D-94AB-42DB-A23F-6B9E2711ADB8}" presName="Name19" presStyleLbl="parChTrans1D4" presStyleIdx="1" presStyleCnt="14"/>
       <dgm:spPr/>
     </dgm:pt>
     <dgm:pt modelId="{02A89A3D-B0E3-41F5-8E8F-CFC3C0648A88}" type="pres">
@@ -2206,7 +2169,7 @@
       <dgm:spPr/>
     </dgm:pt>
     <dgm:pt modelId="{55C79116-3FEA-41A8-A479-CB0E380F7808}" type="pres">
-      <dgm:prSet presAssocID="{595FCBCB-6F4C-41E0-9D57-CC8BC973C07C}" presName="level2Shape" presStyleLbl="node4" presStyleIdx="1" presStyleCnt="15"/>
+      <dgm:prSet presAssocID="{595FCBCB-6F4C-41E0-9D57-CC8BC973C07C}" presName="level2Shape" presStyleLbl="node4" presStyleIdx="1" presStyleCnt="14"/>
       <dgm:spPr/>
     </dgm:pt>
     <dgm:pt modelId="{71BB90E9-42D8-4260-AC0A-A4147B2D318A}" type="pres">
@@ -2246,7 +2209,7 @@
       <dgm:spPr/>
     </dgm:pt>
     <dgm:pt modelId="{6068B2E9-439A-4D4A-9F07-1BD033C7220C}" type="pres">
-      <dgm:prSet presAssocID="{76C26345-8BCA-4CE2-B48B-2D33FBBB060B}" presName="Name19" presStyleLbl="parChTrans1D4" presStyleIdx="2" presStyleCnt="15"/>
+      <dgm:prSet presAssocID="{76C26345-8BCA-4CE2-B48B-2D33FBBB060B}" presName="Name19" presStyleLbl="parChTrans1D4" presStyleIdx="2" presStyleCnt="14"/>
       <dgm:spPr/>
     </dgm:pt>
     <dgm:pt modelId="{2AB79E5E-3E0F-4B15-8C12-2C7C7F37CC6E}" type="pres">
@@ -2254,7 +2217,7 @@
       <dgm:spPr/>
     </dgm:pt>
     <dgm:pt modelId="{DA212266-545D-45F1-A27D-0FB54745C5C9}" type="pres">
-      <dgm:prSet presAssocID="{A9C89BFF-0134-47A9-B18B-7F769EAE5F3A}" presName="level2Shape" presStyleLbl="node4" presStyleIdx="2" presStyleCnt="15"/>
+      <dgm:prSet presAssocID="{A9C89BFF-0134-47A9-B18B-7F769EAE5F3A}" presName="level2Shape" presStyleLbl="node4" presStyleIdx="2" presStyleCnt="14"/>
       <dgm:spPr/>
     </dgm:pt>
     <dgm:pt modelId="{260D8AF3-1154-4CC0-AD53-C84DA5FA04E1}" type="pres">
@@ -2262,7 +2225,7 @@
       <dgm:spPr/>
     </dgm:pt>
     <dgm:pt modelId="{9546DA21-7CA2-4F3B-87CA-3168F16C6E7E}" type="pres">
-      <dgm:prSet presAssocID="{D4015DCB-90CE-418D-BA17-E20EB5979634}" presName="Name19" presStyleLbl="parChTrans1D4" presStyleIdx="3" presStyleCnt="15"/>
+      <dgm:prSet presAssocID="{D4015DCB-90CE-418D-BA17-E20EB5979634}" presName="Name19" presStyleLbl="parChTrans1D4" presStyleIdx="3" presStyleCnt="14"/>
       <dgm:spPr/>
     </dgm:pt>
     <dgm:pt modelId="{8B18F66F-752D-4B20-8C19-341C00949D60}" type="pres">
@@ -2270,7 +2233,7 @@
       <dgm:spPr/>
     </dgm:pt>
     <dgm:pt modelId="{C2262EFB-5BE9-4548-98FA-51838DD8F6DF}" type="pres">
-      <dgm:prSet presAssocID="{D692D1F3-8B04-4096-AA22-E14E93E2AD30}" presName="level2Shape" presStyleLbl="node4" presStyleIdx="3" presStyleCnt="15"/>
+      <dgm:prSet presAssocID="{D692D1F3-8B04-4096-AA22-E14E93E2AD30}" presName="level2Shape" presStyleLbl="node4" presStyleIdx="3" presStyleCnt="14"/>
       <dgm:spPr/>
     </dgm:pt>
     <dgm:pt modelId="{12141DC4-C979-4542-83DB-5BA320FCFE51}" type="pres">
@@ -2278,7 +2241,7 @@
       <dgm:spPr/>
     </dgm:pt>
     <dgm:pt modelId="{04405E15-0B20-4F53-A85C-E932BDDB8237}" type="pres">
-      <dgm:prSet presAssocID="{0B8E2C65-A4D7-4B41-A006-CAAA09EDACC5}" presName="Name19" presStyleLbl="parChTrans1D4" presStyleIdx="4" presStyleCnt="15"/>
+      <dgm:prSet presAssocID="{0B8E2C65-A4D7-4B41-A006-CAAA09EDACC5}" presName="Name19" presStyleLbl="parChTrans1D4" presStyleIdx="4" presStyleCnt="14"/>
       <dgm:spPr/>
     </dgm:pt>
     <dgm:pt modelId="{19068072-4B54-4A6F-963A-48715DEA5881}" type="pres">
@@ -2286,7 +2249,7 @@
       <dgm:spPr/>
     </dgm:pt>
     <dgm:pt modelId="{6B117D17-8BD8-4AE3-810B-A881321E5DD9}" type="pres">
-      <dgm:prSet presAssocID="{1CCEED45-57D7-4641-81C9-5908579CE245}" presName="level2Shape" presStyleLbl="node4" presStyleIdx="4" presStyleCnt="15"/>
+      <dgm:prSet presAssocID="{1CCEED45-57D7-4641-81C9-5908579CE245}" presName="level2Shape" presStyleLbl="node4" presStyleIdx="4" presStyleCnt="14"/>
       <dgm:spPr/>
     </dgm:pt>
     <dgm:pt modelId="{BBB2DBB5-E63F-495F-9C9A-8A5D8522A497}" type="pres">
@@ -2294,7 +2257,7 @@
       <dgm:spPr/>
     </dgm:pt>
     <dgm:pt modelId="{94C352C4-3E3C-489A-9242-7542C89615E3}" type="pres">
-      <dgm:prSet presAssocID="{B3339EB3-2CFC-4D27-A28B-A1DA1C20A05A}" presName="Name19" presStyleLbl="parChTrans1D4" presStyleIdx="5" presStyleCnt="15"/>
+      <dgm:prSet presAssocID="{B3339EB3-2CFC-4D27-A28B-A1DA1C20A05A}" presName="Name19" presStyleLbl="parChTrans1D4" presStyleIdx="5" presStyleCnt="14"/>
       <dgm:spPr/>
     </dgm:pt>
     <dgm:pt modelId="{716E8AC2-84AE-4D29-9A1D-2C84766F12F0}" type="pres">
@@ -2302,7 +2265,7 @@
       <dgm:spPr/>
     </dgm:pt>
     <dgm:pt modelId="{2B3CB1BC-6D96-470A-BFBD-A00B79B46B8B}" type="pres">
-      <dgm:prSet presAssocID="{F9922D17-25E5-4FD7-B1AA-578A1B7C65C6}" presName="level2Shape" presStyleLbl="node4" presStyleIdx="5" presStyleCnt="15"/>
+      <dgm:prSet presAssocID="{F9922D17-25E5-4FD7-B1AA-578A1B7C65C6}" presName="level2Shape" presStyleLbl="node4" presStyleIdx="5" presStyleCnt="14"/>
       <dgm:spPr/>
     </dgm:pt>
     <dgm:pt modelId="{9539B342-F682-40BB-9BD0-39FC5337E852}" type="pres">
@@ -2310,7 +2273,7 @@
       <dgm:spPr/>
     </dgm:pt>
     <dgm:pt modelId="{CB6BE97F-F378-44D8-A2B2-1513F719E2F3}" type="pres">
-      <dgm:prSet presAssocID="{EDC9A178-2154-4366-98B0-33B34586D7EA}" presName="Name19" presStyleLbl="parChTrans1D4" presStyleIdx="6" presStyleCnt="15"/>
+      <dgm:prSet presAssocID="{EDC9A178-2154-4366-98B0-33B34586D7EA}" presName="Name19" presStyleLbl="parChTrans1D4" presStyleIdx="6" presStyleCnt="14"/>
       <dgm:spPr/>
     </dgm:pt>
     <dgm:pt modelId="{037A5789-658A-4803-8635-D7D7917B1D18}" type="pres">
@@ -2318,7 +2281,7 @@
       <dgm:spPr/>
     </dgm:pt>
     <dgm:pt modelId="{5F36A6FB-CB7F-4DE6-B6F5-DE1826698F42}" type="pres">
-      <dgm:prSet presAssocID="{82C78B36-0FA6-435A-86B9-9330BA5F59EB}" presName="level2Shape" presStyleLbl="node4" presStyleIdx="6" presStyleCnt="15"/>
+      <dgm:prSet presAssocID="{82C78B36-0FA6-435A-86B9-9330BA5F59EB}" presName="level2Shape" presStyleLbl="node4" presStyleIdx="6" presStyleCnt="14"/>
       <dgm:spPr/>
     </dgm:pt>
     <dgm:pt modelId="{7B16E392-CFB9-4511-80CC-B12B55CE4AF9}" type="pres">
@@ -2358,7 +2321,7 @@
       <dgm:spPr/>
     </dgm:pt>
     <dgm:pt modelId="{4EED4EC6-C75E-4237-B513-1F528969B037}" type="pres">
-      <dgm:prSet presAssocID="{39E7187F-BF44-4434-ABA8-1C914D1E277A}" presName="Name19" presStyleLbl="parChTrans1D4" presStyleIdx="7" presStyleCnt="15"/>
+      <dgm:prSet presAssocID="{39E7187F-BF44-4434-ABA8-1C914D1E277A}" presName="Name19" presStyleLbl="parChTrans1D4" presStyleIdx="7" presStyleCnt="14"/>
       <dgm:spPr/>
     </dgm:pt>
     <dgm:pt modelId="{6E0FDFC1-4213-4B9B-8ECC-5730827380B1}" type="pres">
@@ -2366,29 +2329,13 @@
       <dgm:spPr/>
     </dgm:pt>
     <dgm:pt modelId="{712DC4DD-54A4-4D11-93B8-AF86C0982CE7}" type="pres">
-      <dgm:prSet presAssocID="{C6E69E37-3961-44EE-94E9-D23872BEE4C9}" presName="level2Shape" presStyleLbl="node4" presStyleIdx="7" presStyleCnt="15"/>
+      <dgm:prSet presAssocID="{C6E69E37-3961-44EE-94E9-D23872BEE4C9}" presName="level2Shape" presStyleLbl="node4" presStyleIdx="7" presStyleCnt="14"/>
       <dgm:spPr/>
     </dgm:pt>
     <dgm:pt modelId="{06FE832E-06DC-449D-9623-40B31DE5260A}" type="pres">
       <dgm:prSet presAssocID="{C6E69E37-3961-44EE-94E9-D23872BEE4C9}" presName="hierChild3" presStyleCnt="0"/>
       <dgm:spPr/>
     </dgm:pt>
-    <dgm:pt modelId="{C5D095A0-8EE6-4EB9-8612-3D40277D1615}" type="pres">
-      <dgm:prSet presAssocID="{CA5091F9-074B-4255-B185-C09D0BE2BF7B}" presName="Name19" presStyleLbl="parChTrans1D4" presStyleIdx="8" presStyleCnt="15"/>
-      <dgm:spPr/>
-    </dgm:pt>
-    <dgm:pt modelId="{B6F8A37B-3728-4132-A0B2-2D455B49C14C}" type="pres">
-      <dgm:prSet presAssocID="{DEA8DC5E-722E-4FFF-BA91-EA999F6AAE91}" presName="Name21" presStyleCnt="0"/>
-      <dgm:spPr/>
-    </dgm:pt>
-    <dgm:pt modelId="{23569E60-B42A-46D6-895B-EB403DAEAB39}" type="pres">
-      <dgm:prSet presAssocID="{DEA8DC5E-722E-4FFF-BA91-EA999F6AAE91}" presName="level2Shape" presStyleLbl="node4" presStyleIdx="8" presStyleCnt="15"/>
-      <dgm:spPr/>
-    </dgm:pt>
-    <dgm:pt modelId="{8AEC3380-BF7F-458C-A43B-E053B8AAB6C8}" type="pres">
-      <dgm:prSet presAssocID="{DEA8DC5E-722E-4FFF-BA91-EA999F6AAE91}" presName="hierChild3" presStyleCnt="0"/>
-      <dgm:spPr/>
-    </dgm:pt>
     <dgm:pt modelId="{F735E2CF-8C29-48C1-84C7-830FEF7D1A26}" type="pres">
       <dgm:prSet presAssocID="{84BE1630-6BEF-48BE-BEB4-441EA60AE7C5}" presName="Name19" presStyleLbl="parChTrans1D2" presStyleIdx="4" presStyleCnt="7"/>
       <dgm:spPr/>
@@ -2422,7 +2369,7 @@
       <dgm:spPr/>
     </dgm:pt>
     <dgm:pt modelId="{70099853-D6C6-45DD-8965-6B3F303FCB7B}" type="pres">
-      <dgm:prSet presAssocID="{7A8423F9-E18F-49C7-AF47-88948CD8E18D}" presName="Name19" presStyleLbl="parChTrans1D4" presStyleIdx="9" presStyleCnt="15"/>
+      <dgm:prSet presAssocID="{7A8423F9-E18F-49C7-AF47-88948CD8E18D}" presName="Name19" presStyleLbl="parChTrans1D4" presStyleIdx="8" presStyleCnt="14"/>
       <dgm:spPr/>
     </dgm:pt>
     <dgm:pt modelId="{38A51D49-7BF0-47A8-95A1-F9BFBDD027E6}" type="pres">
@@ -2430,7 +2377,7 @@
       <dgm:spPr/>
     </dgm:pt>
     <dgm:pt modelId="{9D4DAB13-3BDF-4004-BBF9-0AF61D5F5F89}" type="pres">
-      <dgm:prSet presAssocID="{6343E979-4FE4-4A70-B59E-3E22D3659816}" presName="level2Shape" presStyleLbl="node4" presStyleIdx="9" presStyleCnt="15"/>
+      <dgm:prSet presAssocID="{6343E979-4FE4-4A70-B59E-3E22D3659816}" presName="level2Shape" presStyleLbl="node4" presStyleIdx="8" presStyleCnt="14"/>
       <dgm:spPr/>
     </dgm:pt>
     <dgm:pt modelId="{723F23CC-2BC6-4953-8F94-321AECE23CFE}" type="pres">
@@ -2438,7 +2385,7 @@
       <dgm:spPr/>
     </dgm:pt>
     <dgm:pt modelId="{4E400D75-3AC2-42DF-9470-72FBEAC0BB79}" type="pres">
-      <dgm:prSet presAssocID="{7B0BD396-2B46-40BD-AC76-2EF21EDDDC81}" presName="Name19" presStyleLbl="parChTrans1D4" presStyleIdx="10" presStyleCnt="15"/>
+      <dgm:prSet presAssocID="{7B0BD396-2B46-40BD-AC76-2EF21EDDDC81}" presName="Name19" presStyleLbl="parChTrans1D4" presStyleIdx="9" presStyleCnt="14"/>
       <dgm:spPr/>
     </dgm:pt>
     <dgm:pt modelId="{E95B1BFA-DB58-4ECD-9D19-69ECEFA2AF32}" type="pres">
@@ -2446,7 +2393,7 @@
       <dgm:spPr/>
     </dgm:pt>
     <dgm:pt modelId="{CF04F5AB-3563-4DB1-A4BC-F556F7D0C9D5}" type="pres">
-      <dgm:prSet presAssocID="{90E52BB7-1EB0-47DC-82EE-28BBD13D64E9}" presName="level2Shape" presStyleLbl="node4" presStyleIdx="10" presStyleCnt="15"/>
+      <dgm:prSet presAssocID="{90E52BB7-1EB0-47DC-82EE-28BBD13D64E9}" presName="level2Shape" presStyleLbl="node4" presStyleIdx="9" presStyleCnt="14"/>
       <dgm:spPr/>
     </dgm:pt>
     <dgm:pt modelId="{5BE4BF58-CDFC-41D8-A720-52A2E11068F3}" type="pres">
@@ -2454,7 +2401,7 @@
       <dgm:spPr/>
     </dgm:pt>
     <dgm:pt modelId="{B6371254-1FFA-4EC8-9A90-4F69AC26C4B8}" type="pres">
-      <dgm:prSet presAssocID="{602223CB-CFD7-40C2-91FA-E4E1E82D12F8}" presName="Name19" presStyleLbl="parChTrans1D4" presStyleIdx="11" presStyleCnt="15"/>
+      <dgm:prSet presAssocID="{602223CB-CFD7-40C2-91FA-E4E1E82D12F8}" presName="Name19" presStyleLbl="parChTrans1D4" presStyleIdx="10" presStyleCnt="14"/>
       <dgm:spPr/>
     </dgm:pt>
     <dgm:pt modelId="{A9817A76-8597-449D-B92F-8AEE85191D54}" type="pres">
@@ -2462,7 +2409,7 @@
       <dgm:spPr/>
     </dgm:pt>
     <dgm:pt modelId="{E9D5C307-8A1D-4EC7-B20E-8E8F48C13981}" type="pres">
-      <dgm:prSet presAssocID="{65164E71-4DD3-40F1-A30B-EC613D040542}" presName="level2Shape" presStyleLbl="node4" presStyleIdx="11" presStyleCnt="15"/>
+      <dgm:prSet presAssocID="{65164E71-4DD3-40F1-A30B-EC613D040542}" presName="level2Shape" presStyleLbl="node4" presStyleIdx="10" presStyleCnt="14"/>
       <dgm:spPr/>
     </dgm:pt>
     <dgm:pt modelId="{1D2F9C2F-4C3B-4B47-AF86-182981AA931E}" type="pres">
@@ -2502,7 +2449,7 @@
       <dgm:spPr/>
     </dgm:pt>
     <dgm:pt modelId="{3D2151FC-33BA-453D-AA0E-CDDCBD0EEE9C}" type="pres">
-      <dgm:prSet presAssocID="{658605B8-67B6-4965-9219-87AD07A2BD57}" presName="Name19" presStyleLbl="parChTrans1D4" presStyleIdx="12" presStyleCnt="15"/>
+      <dgm:prSet presAssocID="{658605B8-67B6-4965-9219-87AD07A2BD57}" presName="Name19" presStyleLbl="parChTrans1D4" presStyleIdx="11" presStyleCnt="14"/>
       <dgm:spPr/>
     </dgm:pt>
     <dgm:pt modelId="{3194FAF6-EE57-4E36-8BE0-00D4A11857C5}" type="pres">
@@ -2510,7 +2457,7 @@
       <dgm:spPr/>
     </dgm:pt>
     <dgm:pt modelId="{AE1D8903-F48F-42E3-945F-5C5316952795}" type="pres">
-      <dgm:prSet presAssocID="{210E38F1-6443-4897-BC67-3DC469B10B3A}" presName="level2Shape" presStyleLbl="node4" presStyleIdx="12" presStyleCnt="15"/>
+      <dgm:prSet presAssocID="{210E38F1-6443-4897-BC67-3DC469B10B3A}" presName="level2Shape" presStyleLbl="node4" presStyleIdx="11" presStyleCnt="14"/>
       <dgm:spPr/>
     </dgm:pt>
     <dgm:pt modelId="{17165570-09AE-408C-AB80-EDC0C6614B48}" type="pres">
@@ -2518,7 +2465,7 @@
       <dgm:spPr/>
     </dgm:pt>
     <dgm:pt modelId="{2D318F84-E12B-497C-A08E-FA9EE0475B26}" type="pres">
-      <dgm:prSet presAssocID="{D0F8BDB2-13EF-4738-B074-310F7068418D}" presName="Name19" presStyleLbl="parChTrans1D4" presStyleIdx="13" presStyleCnt="15"/>
+      <dgm:prSet presAssocID="{D0F8BDB2-13EF-4738-B074-310F7068418D}" presName="Name19" presStyleLbl="parChTrans1D4" presStyleIdx="12" presStyleCnt="14"/>
       <dgm:spPr/>
     </dgm:pt>
     <dgm:pt modelId="{D8EC8B46-CDC9-4660-94F0-DF6EFA39AF9C}" type="pres">
@@ -2526,7 +2473,7 @@
       <dgm:spPr/>
     </dgm:pt>
     <dgm:pt modelId="{920982DC-2630-4054-B387-AEC5EDAB1340}" type="pres">
-      <dgm:prSet presAssocID="{E195E9F6-7564-48BE-A20F-8E15DF27D81A}" presName="level2Shape" presStyleLbl="node4" presStyleIdx="13" presStyleCnt="15"/>
+      <dgm:prSet presAssocID="{E195E9F6-7564-48BE-A20F-8E15DF27D81A}" presName="level2Shape" presStyleLbl="node4" presStyleIdx="12" presStyleCnt="14"/>
       <dgm:spPr/>
     </dgm:pt>
     <dgm:pt modelId="{486EF65B-A10B-44C6-B9CA-9FB5ECE47B71}" type="pres">
@@ -2566,7 +2513,7 @@
       <dgm:spPr/>
     </dgm:pt>
     <dgm:pt modelId="{95517795-1F73-461A-B8A9-0DB9072BC468}" type="pres">
-      <dgm:prSet presAssocID="{5A1392F2-9813-4C0C-9524-55F25A946D72}" presName="Name19" presStyleLbl="parChTrans1D4" presStyleIdx="14" presStyleCnt="15"/>
+      <dgm:prSet presAssocID="{5A1392F2-9813-4C0C-9524-55F25A946D72}" presName="Name19" presStyleLbl="parChTrans1D4" presStyleIdx="13" presStyleCnt="14"/>
       <dgm:spPr/>
     </dgm:pt>
     <dgm:pt modelId="{9BFB5F0E-9487-4CD9-94ED-4B747B95E452}" type="pres">
@@ -2574,7 +2521,7 @@
       <dgm:spPr/>
     </dgm:pt>
     <dgm:pt modelId="{51EAB6DB-A7F8-4F89-835D-ED7DFDC5E4CD}" type="pres">
-      <dgm:prSet presAssocID="{2B9145D1-EB7E-4900-B323-62729B920F30}" presName="level2Shape" presStyleLbl="node4" presStyleIdx="14" presStyleCnt="15"/>
+      <dgm:prSet presAssocID="{2B9145D1-EB7E-4900-B323-62729B920F30}" presName="level2Shape" presStyleLbl="node4" presStyleIdx="13" presStyleCnt="14"/>
       <dgm:spPr/>
     </dgm:pt>
     <dgm:pt modelId="{39F4CE89-3B6A-4973-B184-14329B08CC52}" type="pres">
@@ -2607,24 +2554,22 @@
     <dgm:cxn modelId="{9DCF0037-6392-4338-9C43-9BE404EE76C6}" type="presOf" srcId="{FF50E59C-F10C-40A6-8558-2A7E5F304E5C}" destId="{93C93900-8187-43D3-8589-C801987549D8}" srcOrd="0" destOrd="0" presId="urn:microsoft.com/office/officeart/2005/8/layout/hierarchy6"/>
     <dgm:cxn modelId="{CE761E37-2097-40AB-B199-7E36BC1D1880}" type="presOf" srcId="{EFFA102A-5D82-49D3-A6E7-45C00C42107B}" destId="{C85E5849-5BD0-41A7-BC45-A54BCA8E87E7}" srcOrd="0" destOrd="0" presId="urn:microsoft.com/office/officeart/2005/8/layout/hierarchy6"/>
     <dgm:cxn modelId="{3678BB3C-ABCE-4036-8BF9-7D306D14FF35}" srcId="{984E7E1A-DD08-4E2E-A546-5DAB66C40362}" destId="{F27108DA-E888-48DE-8C97-7FDC95CC2EF6}" srcOrd="6" destOrd="0" parTransId="{39401BF9-8334-48FD-97B1-B5FF75DD8ED7}" sibTransId="{66761398-FF62-4B70-AD78-EE255350EFAC}"/>
-    <dgm:cxn modelId="{8AF7D83C-2A35-4B4E-9A89-87807C35D1FB}" srcId="{C6E69E37-3961-44EE-94E9-D23872BEE4C9}" destId="{DEA8DC5E-722E-4FFF-BA91-EA999F6AAE91}" srcOrd="0" destOrd="0" parTransId="{CA5091F9-074B-4255-B185-C09D0BE2BF7B}" sibTransId="{64D4773E-534A-4E7B-A0A1-8D87DE867EA7}"/>
     <dgm:cxn modelId="{A2852640-88E7-443E-9784-8B9CD43E7FFF}" type="presOf" srcId="{602223CB-CFD7-40C2-91FA-E4E1E82D12F8}" destId="{B6371254-1FFA-4EC8-9A90-4F69AC26C4B8}" srcOrd="0" destOrd="0" presId="urn:microsoft.com/office/officeart/2005/8/layout/hierarchy6"/>
+    <dgm:cxn modelId="{19267D47-12AF-407B-95D0-CE67232A70C6}" type="presOf" srcId="{664B246F-00B5-4610-86EB-ACE0B8B7FA38}" destId="{327FBF58-624F-4F1F-9921-6E06642364B9}" srcOrd="0" destOrd="0" presId="urn:microsoft.com/office/officeart/2005/8/layout/hierarchy6"/>
+    <dgm:cxn modelId="{8F9BFC49-62BA-4DBB-A4FA-FDF3587EA851}" srcId="{6169ABB3-9EA3-4A97-9BDB-7BF1A5E8319C}" destId="{64108CB1-DB75-4E6C-B114-0F078EBFAA65}" srcOrd="0" destOrd="0" parTransId="{4672E1E4-8BCB-4F8A-9715-DD03D099E9B8}" sibTransId="{926064D3-9C23-498F-82E9-95C446588308}"/>
+    <dgm:cxn modelId="{7C3DE64C-953A-4B36-89BF-C3A300F94624}" srcId="{984E7E1A-DD08-4E2E-A546-5DAB66C40362}" destId="{FB132DEB-3EBB-4B7B-9E10-1EA28E437B0C}" srcOrd="4" destOrd="0" parTransId="{84BE1630-6BEF-48BE-BEB4-441EA60AE7C5}" sibTransId="{3DA0803E-74EB-47A7-880B-91D87ACD481A}"/>
+    <dgm:cxn modelId="{6193E151-7B4B-421D-8E3E-D3E6FEF0B0BC}" srcId="{64108CB1-DB75-4E6C-B114-0F078EBFAA65}" destId="{210E38F1-6443-4897-BC67-3DC469B10B3A}" srcOrd="0" destOrd="0" parTransId="{658605B8-67B6-4965-9219-87AD07A2BD57}" sibTransId="{0132DBF9-A877-41CA-AAEC-9BACB1A6367E}"/>
+    <dgm:cxn modelId="{85363456-C352-4A49-B620-DC5013112521}" type="presOf" srcId="{E1A4E5F0-82C1-4444-9CDA-2EFE9A53106D}" destId="{7AC0F532-950B-4237-B2A3-453E379DA90E}" srcOrd="0" destOrd="0" presId="urn:microsoft.com/office/officeart/2005/8/layout/hierarchy6"/>
     <dgm:cxn modelId="{B391775D-525A-4463-8187-54DC5ADE9173}" srcId="{638D4A18-E8B7-45E5-8EAA-4C0D29849159}" destId="{A9C89BFF-0134-47A9-B18B-7F769EAE5F3A}" srcOrd="0" destOrd="0" parTransId="{76C26345-8BCA-4CE2-B48B-2D33FBBB060B}" sibTransId="{9B9C4B6C-A25D-4B6F-9C1D-204100944D66}"/>
     <dgm:cxn modelId="{1B414D5E-DAE6-43F4-8636-B9840380AF37}" srcId="{46EFE5C5-7E26-4632-AB0D-CFDE009726AC}" destId="{FF50E59C-F10C-40A6-8558-2A7E5F304E5C}" srcOrd="0" destOrd="0" parTransId="{44E55A98-4A09-4633-8BC8-3C1A3C60F82C}" sibTransId="{CE397DF0-0DE8-4FA7-B0E1-41D1DCB9AFE5}"/>
     <dgm:cxn modelId="{CA475D5F-B922-4F1A-BAC9-748E3A74C050}" type="presOf" srcId="{EBD4D5EB-965D-43EB-B803-B2DBA1A47692}" destId="{6F2A1E2D-C6A8-49EA-9BF1-89BB72F13956}" srcOrd="0" destOrd="0" presId="urn:microsoft.com/office/officeart/2005/8/layout/hierarchy6"/>
     <dgm:cxn modelId="{3075BF60-0E71-406F-899F-7B94CC627092}" type="presOf" srcId="{F27108DA-E888-48DE-8C97-7FDC95CC2EF6}" destId="{1D4FB0B1-442C-44CE-BE21-E9FDAD3A9144}" srcOrd="0" destOrd="0" presId="urn:microsoft.com/office/officeart/2005/8/layout/hierarchy6"/>
     <dgm:cxn modelId="{AE0BF061-65D8-4D34-8606-743D4072C890}" type="presOf" srcId="{DFFEDB4F-CB16-440A-AC1A-1DC7D4CDB94A}" destId="{CADF8BA8-4C18-4BCF-B785-1B1223495F63}" srcOrd="0" destOrd="0" presId="urn:microsoft.com/office/officeart/2005/8/layout/hierarchy6"/>
     <dgm:cxn modelId="{F804F562-696E-426C-80BC-987310D8D62E}" type="presOf" srcId="{C6E69E37-3961-44EE-94E9-D23872BEE4C9}" destId="{712DC4DD-54A4-4D11-93B8-AF86C0982CE7}" srcOrd="0" destOrd="0" presId="urn:microsoft.com/office/officeart/2005/8/layout/hierarchy6"/>
-    <dgm:cxn modelId="{8B58F964-2F52-4B55-83BA-29040AD2CF62}" type="presOf" srcId="{DEA8DC5E-722E-4FFF-BA91-EA999F6AAE91}" destId="{23569E60-B42A-46D6-895B-EB403DAEAB39}" srcOrd="0" destOrd="0" presId="urn:microsoft.com/office/officeart/2005/8/layout/hierarchy6"/>
     <dgm:cxn modelId="{076B8F65-719A-45DD-B51F-75F05F158467}" type="presOf" srcId="{658605B8-67B6-4965-9219-87AD07A2BD57}" destId="{3D2151FC-33BA-453D-AA0E-CDDCBD0EEE9C}" srcOrd="0" destOrd="0" presId="urn:microsoft.com/office/officeart/2005/8/layout/hierarchy6"/>
-    <dgm:cxn modelId="{19267D47-12AF-407B-95D0-CE67232A70C6}" type="presOf" srcId="{664B246F-00B5-4610-86EB-ACE0B8B7FA38}" destId="{327FBF58-624F-4F1F-9921-6E06642364B9}" srcOrd="0" destOrd="0" presId="urn:microsoft.com/office/officeart/2005/8/layout/hierarchy6"/>
     <dgm:cxn modelId="{28D1F069-CC6A-4B7D-87AB-024ED5B8F742}" type="presOf" srcId="{FC8D3CF0-2901-4A86-BB1A-052FBF8D6B11}" destId="{909756E3-99E7-44AA-A3C7-19374AE5DAB8}" srcOrd="0" destOrd="0" presId="urn:microsoft.com/office/officeart/2005/8/layout/hierarchy6"/>
-    <dgm:cxn modelId="{8F9BFC49-62BA-4DBB-A4FA-FDF3587EA851}" srcId="{6169ABB3-9EA3-4A97-9BDB-7BF1A5E8319C}" destId="{64108CB1-DB75-4E6C-B114-0F078EBFAA65}" srcOrd="0" destOrd="0" parTransId="{4672E1E4-8BCB-4F8A-9715-DD03D099E9B8}" sibTransId="{926064D3-9C23-498F-82E9-95C446588308}"/>
-    <dgm:cxn modelId="{7C3DE64C-953A-4B36-89BF-C3A300F94624}" srcId="{984E7E1A-DD08-4E2E-A546-5DAB66C40362}" destId="{FB132DEB-3EBB-4B7B-9E10-1EA28E437B0C}" srcOrd="4" destOrd="0" parTransId="{84BE1630-6BEF-48BE-BEB4-441EA60AE7C5}" sibTransId="{3DA0803E-74EB-47A7-880B-91D87ACD481A}"/>
-    <dgm:cxn modelId="{6193E151-7B4B-421D-8E3E-D3E6FEF0B0BC}" srcId="{64108CB1-DB75-4E6C-B114-0F078EBFAA65}" destId="{210E38F1-6443-4897-BC67-3DC469B10B3A}" srcOrd="0" destOrd="0" parTransId="{658605B8-67B6-4965-9219-87AD07A2BD57}" sibTransId="{0132DBF9-A877-41CA-AAEC-9BACB1A6367E}"/>
     <dgm:cxn modelId="{E9FD1272-E01D-4880-BFDE-9A1AAA5292D5}" srcId="{910FF4E3-4B73-471E-A733-428EDE879319}" destId="{2B9145D1-EB7E-4900-B323-62729B920F30}" srcOrd="0" destOrd="0" parTransId="{5A1392F2-9813-4C0C-9524-55F25A946D72}" sibTransId="{FE9D72FD-6015-4C6F-8761-506C30B7F8B6}"/>
     <dgm:cxn modelId="{4C43D973-FE5F-4969-B009-5FF2F8FD2D9D}" type="presOf" srcId="{F9806694-F79F-4F0F-B80B-D8AEC14A4AE4}" destId="{BD3EDBA1-58E6-46D1-8F92-11C7D932A901}" srcOrd="0" destOrd="0" presId="urn:microsoft.com/office/officeart/2005/8/layout/hierarchy6"/>
-    <dgm:cxn modelId="{85363456-C352-4A49-B620-DC5013112521}" type="presOf" srcId="{E1A4E5F0-82C1-4444-9CDA-2EFE9A53106D}" destId="{7AC0F532-950B-4237-B2A3-453E379DA90E}" srcOrd="0" destOrd="0" presId="urn:microsoft.com/office/officeart/2005/8/layout/hierarchy6"/>
     <dgm:cxn modelId="{B835F177-20F8-4C9B-8676-0FA87CFA76ED}" type="presOf" srcId="{FB132DEB-3EBB-4B7B-9E10-1EA28E437B0C}" destId="{8083ECF3-4A6D-4D09-B080-CA9E2FF57236}" srcOrd="0" destOrd="0" presId="urn:microsoft.com/office/officeart/2005/8/layout/hierarchy6"/>
     <dgm:cxn modelId="{C5C5DA7E-7625-41B0-BDF4-F13B40D2882F}" type="presOf" srcId="{95F92B39-5BD1-41DA-921B-40270E333897}" destId="{D5810A6F-9BEC-4CA9-A2D9-D690ED127B30}" srcOrd="0" destOrd="0" presId="urn:microsoft.com/office/officeart/2005/8/layout/hierarchy6"/>
     <dgm:cxn modelId="{C5FAB381-F340-4B7A-BFF8-003E4B2959E3}" type="presOf" srcId="{1CCEED45-57D7-4641-81C9-5908579CE245}" destId="{6B117D17-8BD8-4AE3-810B-A881321E5DD9}" srcOrd="0" destOrd="0" presId="urn:microsoft.com/office/officeart/2005/8/layout/hierarchy6"/>
@@ -2644,14 +2589,13 @@
     <dgm:cxn modelId="{DA14B1B2-ECFC-4D44-92B1-BEC1F0213248}" type="presOf" srcId="{82C78B36-0FA6-435A-86B9-9330BA5F59EB}" destId="{5F36A6FB-CB7F-4DE6-B6F5-DE1826698F42}" srcOrd="0" destOrd="0" presId="urn:microsoft.com/office/officeart/2005/8/layout/hierarchy6"/>
     <dgm:cxn modelId="{18760BB4-4568-4CC5-A218-603643F963A6}" type="presOf" srcId="{4CC81563-AFF2-44A9-B9B0-EF1C87661122}" destId="{8C51603B-18E2-460C-A259-41942E28FCC3}" srcOrd="0" destOrd="0" presId="urn:microsoft.com/office/officeart/2005/8/layout/hierarchy6"/>
     <dgm:cxn modelId="{77E3D7B8-FF68-4B8B-90B6-B8264E692A72}" srcId="{F9922D17-25E5-4FD7-B1AA-578A1B7C65C6}" destId="{82C78B36-0FA6-435A-86B9-9330BA5F59EB}" srcOrd="0" destOrd="0" parTransId="{EDC9A178-2154-4366-98B0-33B34586D7EA}" sibTransId="{01114DF0-1419-4280-A420-E0C884386A4F}"/>
+    <dgm:cxn modelId="{DA425ABA-1E59-4D58-A3F9-7632E86B868D}" type="presOf" srcId="{39401BF9-8334-48FD-97B1-B5FF75DD8ED7}" destId="{44A92FEE-33E2-4B91-A94C-B4EA8EE86B60}" srcOrd="0" destOrd="0" presId="urn:microsoft.com/office/officeart/2005/8/layout/hierarchy6"/>
     <dgm:cxn modelId="{36CF5DBA-4966-49D8-94F1-FAC98510D4DF}" type="presOf" srcId="{E195E9F6-7564-48BE-A20F-8E15DF27D81A}" destId="{920982DC-2630-4054-B387-AEC5EDAB1340}" srcOrd="0" destOrd="0" presId="urn:microsoft.com/office/officeart/2005/8/layout/hierarchy6"/>
     <dgm:cxn modelId="{EEB469BA-FECB-41C0-B3C4-44F45DB0F25C}" type="presOf" srcId="{6331599E-52B8-4A6C-B3A0-6191E729069E}" destId="{C35DDB86-B450-4822-9D2F-E71FF9968A21}" srcOrd="0" destOrd="0" presId="urn:microsoft.com/office/officeart/2005/8/layout/hierarchy6"/>
-    <dgm:cxn modelId="{DA425ABA-1E59-4D58-A3F9-7632E86B868D}" type="presOf" srcId="{39401BF9-8334-48FD-97B1-B5FF75DD8ED7}" destId="{44A92FEE-33E2-4B91-A94C-B4EA8EE86B60}" srcOrd="0" destOrd="0" presId="urn:microsoft.com/office/officeart/2005/8/layout/hierarchy6"/>
     <dgm:cxn modelId="{362B10BB-9CBA-499E-B87E-549CB8B04D92}" srcId="{984E7E1A-DD08-4E2E-A546-5DAB66C40362}" destId="{E1A4E5F0-82C1-4444-9CDA-2EFE9A53106D}" srcOrd="0" destOrd="0" parTransId="{FC8D3CF0-2901-4A86-BB1A-052FBF8D6B11}" sibTransId="{1F038FBC-60CA-48E2-9EB7-A456DEFE1AE4}"/>
     <dgm:cxn modelId="{0BDA3BBB-DEB6-4BF6-9D8C-5DF0FD6F9376}" type="presOf" srcId="{44E55A98-4A09-4633-8BC8-3C1A3C60F82C}" destId="{4E69DF13-5E8E-4E91-975F-9FDDE2936E47}" srcOrd="0" destOrd="0" presId="urn:microsoft.com/office/officeart/2005/8/layout/hierarchy6"/>
     <dgm:cxn modelId="{1A0C89BF-D174-4ED0-8083-1CC9998E7155}" srcId="{8D053341-47DE-4A56-8DB5-F4344314674C}" destId="{EFFA102A-5D82-49D3-A6E7-45C00C42107B}" srcOrd="0" destOrd="0" parTransId="{DFFEDB4F-CB16-440A-AC1A-1DC7D4CDB94A}" sibTransId="{B62333E8-4DCB-4AEF-9231-01F6B6767A44}"/>
     <dgm:cxn modelId="{A1A42AC5-B3CA-474B-A03B-83A5BC59A4EF}" srcId="{984E7E1A-DD08-4E2E-A546-5DAB66C40362}" destId="{8D053341-47DE-4A56-8DB5-F4344314674C}" srcOrd="1" destOrd="0" parTransId="{EBD4D5EB-965D-43EB-B803-B2DBA1A47692}" sibTransId="{176D6055-7813-445A-AD4E-B8512697E12E}"/>
-    <dgm:cxn modelId="{D358ABC6-1102-4F18-B5B8-68BF2A9736F6}" type="presOf" srcId="{CA5091F9-074B-4255-B185-C09D0BE2BF7B}" destId="{C5D095A0-8EE6-4EB9-8612-3D40277D1615}" srcOrd="0" destOrd="0" presId="urn:microsoft.com/office/officeart/2005/8/layout/hierarchy6"/>
     <dgm:cxn modelId="{FDA7AFC6-A5D6-4C1E-88EA-9467ADC72810}" type="presOf" srcId="{39E7187F-BF44-4434-ABA8-1C914D1E277A}" destId="{4EED4EC6-C75E-4237-B513-1F528969B037}" srcOrd="0" destOrd="0" presId="urn:microsoft.com/office/officeart/2005/8/layout/hierarchy6"/>
     <dgm:cxn modelId="{8A33DAC6-D9DF-4D48-B64D-808F92F2B77E}" srcId="{EFFA102A-5D82-49D3-A6E7-45C00C42107B}" destId="{95F92B39-5BD1-41DA-921B-40270E333897}" srcOrd="0" destOrd="0" parTransId="{78A11304-B47B-426C-80D9-23F105284D80}" sibTransId="{19CA03D8-84BD-45E9-ACB4-36731CEB3A27}"/>
     <dgm:cxn modelId="{96ABEFCB-93B8-4F1F-9ED6-D30BB529CB39}" type="presOf" srcId="{84BE1630-6BEF-48BE-BEB4-441EA60AE7C5}" destId="{F735E2CF-8C29-48C1-84C7-830FEF7D1A26}" srcOrd="0" destOrd="0" presId="urn:microsoft.com/office/officeart/2005/8/layout/hierarchy6"/>
@@ -2739,10 +2683,6 @@
     <dgm:cxn modelId="{8FDFE82C-F837-44AC-A02F-E62594519BEB}" type="presParOf" srcId="{47B2A419-6ED4-4C73-86AA-9F655C1C9D2A}" destId="{6E0FDFC1-4213-4B9B-8ECC-5730827380B1}" srcOrd="1" destOrd="0" presId="urn:microsoft.com/office/officeart/2005/8/layout/hierarchy6"/>
     <dgm:cxn modelId="{4DDF0D92-0BDF-4229-8768-34F3215AA93F}" type="presParOf" srcId="{6E0FDFC1-4213-4B9B-8ECC-5730827380B1}" destId="{712DC4DD-54A4-4D11-93B8-AF86C0982CE7}" srcOrd="0" destOrd="0" presId="urn:microsoft.com/office/officeart/2005/8/layout/hierarchy6"/>
     <dgm:cxn modelId="{1FF76F1D-0206-4BBC-B4EA-CF680036CA80}" type="presParOf" srcId="{6E0FDFC1-4213-4B9B-8ECC-5730827380B1}" destId="{06FE832E-06DC-449D-9623-40B31DE5260A}" srcOrd="1" destOrd="0" presId="urn:microsoft.com/office/officeart/2005/8/layout/hierarchy6"/>
-    <dgm:cxn modelId="{51CA2E49-9BBF-4EB0-BD17-93F0239BCC06}" type="presParOf" srcId="{06FE832E-06DC-449D-9623-40B31DE5260A}" destId="{C5D095A0-8EE6-4EB9-8612-3D40277D1615}" srcOrd="0" destOrd="0" presId="urn:microsoft.com/office/officeart/2005/8/layout/hierarchy6"/>
-    <dgm:cxn modelId="{885CC7C6-8B3F-4D41-8733-42A45BC9B1C5}" type="presParOf" srcId="{06FE832E-06DC-449D-9623-40B31DE5260A}" destId="{B6F8A37B-3728-4132-A0B2-2D455B49C14C}" srcOrd="1" destOrd="0" presId="urn:microsoft.com/office/officeart/2005/8/layout/hierarchy6"/>
-    <dgm:cxn modelId="{4FE04A9C-C830-48A6-B315-1143C4550A90}" type="presParOf" srcId="{B6F8A37B-3728-4132-A0B2-2D455B49C14C}" destId="{23569E60-B42A-46D6-895B-EB403DAEAB39}" srcOrd="0" destOrd="0" presId="urn:microsoft.com/office/officeart/2005/8/layout/hierarchy6"/>
-    <dgm:cxn modelId="{3C465CF2-BFDB-4F79-A4E8-038DE37D0B2B}" type="presParOf" srcId="{B6F8A37B-3728-4132-A0B2-2D455B49C14C}" destId="{8AEC3380-BF7F-458C-A43B-E053B8AAB6C8}" srcOrd="1" destOrd="0" presId="urn:microsoft.com/office/officeart/2005/8/layout/hierarchy6"/>
     <dgm:cxn modelId="{EBD5E54E-ED40-4A2D-ABBF-427F6308CEB8}" type="presParOf" srcId="{1310C93A-257F-43F9-9C19-53032BA77C1A}" destId="{F735E2CF-8C29-48C1-84C7-830FEF7D1A26}" srcOrd="8" destOrd="0" presId="urn:microsoft.com/office/officeart/2005/8/layout/hierarchy6"/>
     <dgm:cxn modelId="{16400667-1294-40B1-9D00-F9B8F8E057E3}" type="presParOf" srcId="{1310C93A-257F-43F9-9C19-53032BA77C1A}" destId="{48AFB0DB-A5F1-4E3C-A955-DF837FAD14E4}" srcOrd="9" destOrd="0" presId="urn:microsoft.com/office/officeart/2005/8/layout/hierarchy6"/>
     <dgm:cxn modelId="{37C69F07-B942-472F-AA00-B88797B89307}" type="presParOf" srcId="{48AFB0DB-A5F1-4E3C-A955-DF837FAD14E4}" destId="{8083ECF3-4A6D-4D09-B080-CA9E2FF57236}" srcOrd="0" destOrd="0" presId="urn:microsoft.com/office/officeart/2005/8/layout/hierarchy6"/>
@@ -4993,144 +4933,6 @@
         <a:ext cx="856696" cy="559525"/>
       </dsp:txXfrm>
     </dsp:sp>
-    <dsp:sp modelId="{C5D095A0-8EE6-4EB9-8612-3D40277D1615}">
-      <dsp:nvSpPr>
-        <dsp:cNvPr id="0" name=""/>
-        <dsp:cNvSpPr/>
-      </dsp:nvSpPr>
-      <dsp:spPr>
-        <a:xfrm>
-          <a:off x="5420801" y="3094783"/>
-          <a:ext cx="91440" cy="237736"/>
-        </a:xfrm>
-        <a:custGeom>
-          <a:avLst/>
-          <a:gdLst/>
-          <a:ahLst/>
-          <a:cxnLst/>
-          <a:rect l="0" t="0" r="0" b="0"/>
-          <a:pathLst>
-            <a:path>
-              <a:moveTo>
-                <a:pt x="45720" y="0"/>
-              </a:moveTo>
-              <a:lnTo>
-                <a:pt x="45720" y="237736"/>
-              </a:lnTo>
-            </a:path>
-          </a:pathLst>
-        </a:custGeom>
-        <a:noFill/>
-        <a:ln w="12700" cap="flat" cmpd="sng" algn="ctr">
-          <a:solidFill>
-            <a:schemeClr val="accent1">
-              <a:tint val="50000"/>
-              <a:hueOff val="0"/>
-              <a:satOff val="0"/>
-              <a:lumOff val="0"/>
-              <a:alphaOff val="0"/>
-            </a:schemeClr>
-          </a:solidFill>
-          <a:prstDash val="solid"/>
-          <a:miter lim="800000"/>
-        </a:ln>
-        <a:effectLst/>
-      </dsp:spPr>
-      <dsp:style>
-        <a:lnRef idx="2">
-          <a:scrgbClr r="0" g="0" b="0"/>
-        </a:lnRef>
-        <a:fillRef idx="0">
-          <a:scrgbClr r="0" g="0" b="0"/>
-        </a:fillRef>
-        <a:effectRef idx="0">
-          <a:scrgbClr r="0" g="0" b="0"/>
-        </a:effectRef>
-        <a:fontRef idx="minor"/>
-      </dsp:style>
-    </dsp:sp>
-    <dsp:sp modelId="{23569E60-B42A-46D6-895B-EB403DAEAB39}">
-      <dsp:nvSpPr>
-        <dsp:cNvPr id="0" name=""/>
-        <dsp:cNvSpPr/>
-      </dsp:nvSpPr>
-      <dsp:spPr>
-        <a:xfrm>
-          <a:off x="5020764" y="3332520"/>
-          <a:ext cx="891512" cy="594341"/>
-        </a:xfrm>
-        <a:prstGeom prst="roundRect">
-          <a:avLst>
-            <a:gd name="adj" fmla="val 10000"/>
-          </a:avLst>
-        </a:prstGeom>
-        <a:solidFill>
-          <a:schemeClr val="accent1">
-            <a:tint val="70000"/>
-            <a:hueOff val="0"/>
-            <a:satOff val="0"/>
-            <a:lumOff val="0"/>
-            <a:alphaOff val="0"/>
-          </a:schemeClr>
-        </a:solidFill>
-        <a:ln w="19050" cap="flat" cmpd="sng" algn="ctr">
-          <a:solidFill>
-            <a:schemeClr val="lt1">
-              <a:hueOff val="0"/>
-              <a:satOff val="0"/>
-              <a:lumOff val="0"/>
-              <a:alphaOff val="0"/>
-            </a:schemeClr>
-          </a:solidFill>
-          <a:prstDash val="solid"/>
-          <a:miter lim="800000"/>
-        </a:ln>
-        <a:effectLst/>
-      </dsp:spPr>
-      <dsp:style>
-        <a:lnRef idx="3">
-          <a:scrgbClr r="0" g="0" b="0"/>
-        </a:lnRef>
-        <a:fillRef idx="1">
-          <a:scrgbClr r="0" g="0" b="0"/>
-        </a:fillRef>
-        <a:effectRef idx="1">
-          <a:scrgbClr r="0" g="0" b="0"/>
-        </a:effectRef>
-        <a:fontRef idx="minor">
-          <a:schemeClr val="lt1"/>
-        </a:fontRef>
-      </dsp:style>
-      <dsp:txBody>
-        <a:bodyPr spcFirstLastPara="0" vert="horz" wrap="square" lIns="30480" tIns="30480" rIns="30480" bIns="30480" numCol="1" spcCol="1270" anchor="ctr" anchorCtr="0">
-          <a:noAutofit/>
-        </a:bodyPr>
-        <a:lstStyle/>
-        <a:p>
-          <a:pPr marL="0" lvl="0" indent="0" algn="ctr" defTabSz="355600">
-            <a:lnSpc>
-              <a:spcPct val="90000"/>
-            </a:lnSpc>
-            <a:spcBef>
-              <a:spcPct val="0"/>
-            </a:spcBef>
-            <a:spcAft>
-              <a:spcPct val="35000"/>
-            </a:spcAft>
-            <a:buNone/>
-          </a:pPr>
-          <a:r>
-            <a:rPr lang="es-ES_tradnl" sz="800" kern="1200" dirty="0"/>
-            <a:t>4.2. Gestión de compras</a:t>
-          </a:r>
-          <a:endParaRPr lang="es-ES" sz="800" kern="1200" dirty="0"/>
-        </a:p>
-      </dsp:txBody>
-      <dsp:txXfrm>
-        <a:off x="5038172" y="3349928"/>
-        <a:ext cx="856696" cy="559525"/>
-      </dsp:txXfrm>
-    </dsp:sp>
     <dsp:sp modelId="{F735E2CF-8C29-48C1-84C7-830FEF7D1A26}">
       <dsp:nvSpPr>
         <dsp:cNvPr id="0" name=""/>
@@ -5403,7 +5205,7 @@
           </a:pPr>
           <a:r>
             <a:rPr lang="es-ES_tradnl" sz="800" kern="1200" dirty="0"/>
-            <a:t>5.1. Cursos</a:t>
+            <a:t>5.1. Modelo de formación</a:t>
           </a:r>
           <a:endParaRPr lang="es-ES" sz="800" kern="1200" dirty="0"/>
         </a:p>
@@ -5541,7 +5343,7 @@
           </a:pPr>
           <a:r>
             <a:rPr lang="es-ES_tradnl" sz="800" kern="1200" dirty="0"/>
-            <a:t>5.2. Personal</a:t>
+            <a:t>5.2. Formación de Personal</a:t>
           </a:r>
           <a:endParaRPr lang="es-ES" sz="800" kern="1200" dirty="0"/>
         </a:p>
@@ -5679,7 +5481,7 @@
           </a:pPr>
           <a:r>
             <a:rPr lang="es-ES_tradnl" sz="800" kern="1200" dirty="0"/>
-            <a:t>5.3 Documentación</a:t>
+            <a:t>5.3 Manuales</a:t>
           </a:r>
           <a:endParaRPr lang="es-ES" sz="800" kern="1200" dirty="0"/>
         </a:p>
@@ -8501,7 +8303,7 @@
           <a:p>
             <a:fld id="{0D884D29-9179-45AE-BA9A-C08EE7A5CD94}" type="datetimeFigureOut">
               <a:rPr lang="es-ES" smtClean="0"/>
-              <a:t>04/11/2018</a:t>
+              <a:t>8/11/18</a:t>
             </a:fld>
             <a:endParaRPr lang="es-ES"/>
           </a:p>
@@ -8555,7 +8357,7 @@
           <a:p>
             <a:fld id="{A48DEAC8-0F5D-4654-993D-4CF0837E1519}" type="slidenum">
               <a:rPr lang="es-ES" smtClean="0"/>
-              <a:t>‹#›</a:t>
+              <a:t>‹Nº›</a:t>
             </a:fld>
             <a:endParaRPr lang="es-ES"/>
           </a:p>
@@ -8699,7 +8501,7 @@
           <a:p>
             <a:fld id="{0D884D29-9179-45AE-BA9A-C08EE7A5CD94}" type="datetimeFigureOut">
               <a:rPr lang="es-ES" smtClean="0"/>
-              <a:t>04/11/2018</a:t>
+              <a:t>8/11/18</a:t>
             </a:fld>
             <a:endParaRPr lang="es-ES"/>
           </a:p>
@@ -8753,7 +8555,7 @@
           <a:p>
             <a:fld id="{A48DEAC8-0F5D-4654-993D-4CF0837E1519}" type="slidenum">
               <a:rPr lang="es-ES" smtClean="0"/>
-              <a:t>‹#›</a:t>
+              <a:t>‹Nº›</a:t>
             </a:fld>
             <a:endParaRPr lang="es-ES"/>
           </a:p>
@@ -8907,7 +8709,7 @@
           <a:p>
             <a:fld id="{0D884D29-9179-45AE-BA9A-C08EE7A5CD94}" type="datetimeFigureOut">
               <a:rPr lang="es-ES" smtClean="0"/>
-              <a:t>04/11/2018</a:t>
+              <a:t>8/11/18</a:t>
             </a:fld>
             <a:endParaRPr lang="es-ES"/>
           </a:p>
@@ -8961,7 +8763,7 @@
           <a:p>
             <a:fld id="{A48DEAC8-0F5D-4654-993D-4CF0837E1519}" type="slidenum">
               <a:rPr lang="es-ES" smtClean="0"/>
-              <a:t>‹#›</a:t>
+              <a:t>‹Nº›</a:t>
             </a:fld>
             <a:endParaRPr lang="es-ES"/>
           </a:p>
@@ -9105,7 +8907,7 @@
           <a:p>
             <a:fld id="{0D884D29-9179-45AE-BA9A-C08EE7A5CD94}" type="datetimeFigureOut">
               <a:rPr lang="es-ES" smtClean="0"/>
-              <a:t>04/11/2018</a:t>
+              <a:t>8/11/18</a:t>
             </a:fld>
             <a:endParaRPr lang="es-ES"/>
           </a:p>
@@ -9159,7 +8961,7 @@
           <a:p>
             <a:fld id="{A48DEAC8-0F5D-4654-993D-4CF0837E1519}" type="slidenum">
               <a:rPr lang="es-ES" smtClean="0"/>
-              <a:t>‹#›</a:t>
+              <a:t>‹Nº›</a:t>
             </a:fld>
             <a:endParaRPr lang="es-ES"/>
           </a:p>
@@ -9380,7 +9182,7 @@
           <a:p>
             <a:fld id="{0D884D29-9179-45AE-BA9A-C08EE7A5CD94}" type="datetimeFigureOut">
               <a:rPr lang="es-ES" smtClean="0"/>
-              <a:t>04/11/2018</a:t>
+              <a:t>8/11/18</a:t>
             </a:fld>
             <a:endParaRPr lang="es-ES"/>
           </a:p>
@@ -9434,7 +9236,7 @@
           <a:p>
             <a:fld id="{A48DEAC8-0F5D-4654-993D-4CF0837E1519}" type="slidenum">
               <a:rPr lang="es-ES" smtClean="0"/>
-              <a:t>‹#›</a:t>
+              <a:t>‹Nº›</a:t>
             </a:fld>
             <a:endParaRPr lang="es-ES"/>
           </a:p>
@@ -9645,7 +9447,7 @@
           <a:p>
             <a:fld id="{0D884D29-9179-45AE-BA9A-C08EE7A5CD94}" type="datetimeFigureOut">
               <a:rPr lang="es-ES" smtClean="0"/>
-              <a:t>04/11/2018</a:t>
+              <a:t>8/11/18</a:t>
             </a:fld>
             <a:endParaRPr lang="es-ES"/>
           </a:p>
@@ -9699,7 +9501,7 @@
           <a:p>
             <a:fld id="{A48DEAC8-0F5D-4654-993D-4CF0837E1519}" type="slidenum">
               <a:rPr lang="es-ES" smtClean="0"/>
-              <a:t>‹#›</a:t>
+              <a:t>‹Nº›</a:t>
             </a:fld>
             <a:endParaRPr lang="es-ES"/>
           </a:p>
@@ -10057,7 +9859,7 @@
           <a:p>
             <a:fld id="{0D884D29-9179-45AE-BA9A-C08EE7A5CD94}" type="datetimeFigureOut">
               <a:rPr lang="es-ES" smtClean="0"/>
-              <a:t>04/11/2018</a:t>
+              <a:t>8/11/18</a:t>
             </a:fld>
             <a:endParaRPr lang="es-ES"/>
           </a:p>
@@ -10111,7 +9913,7 @@
           <a:p>
             <a:fld id="{A48DEAC8-0F5D-4654-993D-4CF0837E1519}" type="slidenum">
               <a:rPr lang="es-ES" smtClean="0"/>
-              <a:t>‹#›</a:t>
+              <a:t>‹Nº›</a:t>
             </a:fld>
             <a:endParaRPr lang="es-ES"/>
           </a:p>
@@ -10198,7 +10000,7 @@
           <a:p>
             <a:fld id="{0D884D29-9179-45AE-BA9A-C08EE7A5CD94}" type="datetimeFigureOut">
               <a:rPr lang="es-ES" smtClean="0"/>
-              <a:t>04/11/2018</a:t>
+              <a:t>8/11/18</a:t>
             </a:fld>
             <a:endParaRPr lang="es-ES"/>
           </a:p>
@@ -10252,7 +10054,7 @@
           <a:p>
             <a:fld id="{A48DEAC8-0F5D-4654-993D-4CF0837E1519}" type="slidenum">
               <a:rPr lang="es-ES" smtClean="0"/>
-              <a:t>‹#›</a:t>
+              <a:t>‹Nº›</a:t>
             </a:fld>
             <a:endParaRPr lang="es-ES"/>
           </a:p>
@@ -10311,7 +10113,7 @@
           <a:p>
             <a:fld id="{0D884D29-9179-45AE-BA9A-C08EE7A5CD94}" type="datetimeFigureOut">
               <a:rPr lang="es-ES" smtClean="0"/>
-              <a:t>04/11/2018</a:t>
+              <a:t>8/11/18</a:t>
             </a:fld>
             <a:endParaRPr lang="es-ES"/>
           </a:p>
@@ -10365,7 +10167,7 @@
           <a:p>
             <a:fld id="{A48DEAC8-0F5D-4654-993D-4CF0837E1519}" type="slidenum">
               <a:rPr lang="es-ES" smtClean="0"/>
-              <a:t>‹#›</a:t>
+              <a:t>‹Nº›</a:t>
             </a:fld>
             <a:endParaRPr lang="es-ES"/>
           </a:p>
@@ -10622,7 +10424,7 @@
           <a:p>
             <a:fld id="{0D884D29-9179-45AE-BA9A-C08EE7A5CD94}" type="datetimeFigureOut">
               <a:rPr lang="es-ES" smtClean="0"/>
-              <a:t>04/11/2018</a:t>
+              <a:t>8/11/18</a:t>
             </a:fld>
             <a:endParaRPr lang="es-ES"/>
           </a:p>
@@ -10676,7 +10478,7 @@
           <a:p>
             <a:fld id="{A48DEAC8-0F5D-4654-993D-4CF0837E1519}" type="slidenum">
               <a:rPr lang="es-ES" smtClean="0"/>
-              <a:t>‹#›</a:t>
+              <a:t>‹Nº›</a:t>
             </a:fld>
             <a:endParaRPr lang="es-ES"/>
           </a:p>
@@ -10910,7 +10712,7 @@
           <a:p>
             <a:fld id="{0D884D29-9179-45AE-BA9A-C08EE7A5CD94}" type="datetimeFigureOut">
               <a:rPr lang="es-ES" smtClean="0"/>
-              <a:t>04/11/2018</a:t>
+              <a:t>8/11/18</a:t>
             </a:fld>
             <a:endParaRPr lang="es-ES"/>
           </a:p>
@@ -10964,7 +10766,7 @@
           <a:p>
             <a:fld id="{A48DEAC8-0F5D-4654-993D-4CF0837E1519}" type="slidenum">
               <a:rPr lang="es-ES" smtClean="0"/>
-              <a:t>‹#›</a:t>
+              <a:t>‹Nº›</a:t>
             </a:fld>
             <a:endParaRPr lang="es-ES"/>
           </a:p>
@@ -11151,7 +10953,7 @@
           <a:p>
             <a:fld id="{0D884D29-9179-45AE-BA9A-C08EE7A5CD94}" type="datetimeFigureOut">
               <a:rPr lang="es-ES" smtClean="0"/>
-              <a:t>04/11/2018</a:t>
+              <a:t>8/11/18</a:t>
             </a:fld>
             <a:endParaRPr lang="es-ES"/>
           </a:p>
@@ -11241,7 +11043,7 @@
           <a:p>
             <a:fld id="{A48DEAC8-0F5D-4654-993D-4CF0837E1519}" type="slidenum">
               <a:rPr lang="es-ES" smtClean="0"/>
-              <a:t>‹#›</a:t>
+              <a:t>‹Nº›</a:t>
             </a:fld>
             <a:endParaRPr lang="es-ES"/>
           </a:p>
@@ -11581,7 +11383,7 @@
           <p:nvPr>
             <p:extLst>
               <p:ext uri="{D42A27DB-BD31-4B8C-83A1-F6EECF244321}">
-                <p14:modId xmlns:p14="http://schemas.microsoft.com/office/powerpoint/2010/main" val="1381855546"/>
+                <p14:modId xmlns:p14="http://schemas.microsoft.com/office/powerpoint/2010/main" val="3994487223"/>
               </p:ext>
             </p:extLst>
           </p:nvPr>

</xml_diff>